<commit_message>
Changed label to "resource path" to emphasize resource aspect of URLs
</commit_message>
<xml_diff>
--- a/slides/intro/img/diagrams.pptx
+++ b/slides/intro/img/diagrams.pptx
@@ -289,7 +289,7 @@
           <a:p>
             <a:fld id="{89247EA3-6A00-914C-B438-6883EA61F3F8}" type="datetimeFigureOut">
               <a:rPr lang="en-US" smtClean="0"/>
-              <a:t>9/5/13</a:t>
+              <a:t>9/7/13</a:t>
             </a:fld>
             <a:endParaRPr lang="en-US"/>
           </a:p>
@@ -459,7 +459,7 @@
           <a:p>
             <a:fld id="{89247EA3-6A00-914C-B438-6883EA61F3F8}" type="datetimeFigureOut">
               <a:rPr lang="en-US" smtClean="0"/>
-              <a:t>9/5/13</a:t>
+              <a:t>9/7/13</a:t>
             </a:fld>
             <a:endParaRPr lang="en-US"/>
           </a:p>
@@ -639,7 +639,7 @@
           <a:p>
             <a:fld id="{89247EA3-6A00-914C-B438-6883EA61F3F8}" type="datetimeFigureOut">
               <a:rPr lang="en-US" smtClean="0"/>
-              <a:t>9/5/13</a:t>
+              <a:t>9/7/13</a:t>
             </a:fld>
             <a:endParaRPr lang="en-US"/>
           </a:p>
@@ -809,7 +809,7 @@
           <a:p>
             <a:fld id="{89247EA3-6A00-914C-B438-6883EA61F3F8}" type="datetimeFigureOut">
               <a:rPr lang="en-US" smtClean="0"/>
-              <a:t>9/5/13</a:t>
+              <a:t>9/7/13</a:t>
             </a:fld>
             <a:endParaRPr lang="en-US"/>
           </a:p>
@@ -1055,7 +1055,7 @@
           <a:p>
             <a:fld id="{89247EA3-6A00-914C-B438-6883EA61F3F8}" type="datetimeFigureOut">
               <a:rPr lang="en-US" smtClean="0"/>
-              <a:t>9/5/13</a:t>
+              <a:t>9/7/13</a:t>
             </a:fld>
             <a:endParaRPr lang="en-US"/>
           </a:p>
@@ -1343,7 +1343,7 @@
           <a:p>
             <a:fld id="{89247EA3-6A00-914C-B438-6883EA61F3F8}" type="datetimeFigureOut">
               <a:rPr lang="en-US" smtClean="0"/>
-              <a:t>9/5/13</a:t>
+              <a:t>9/7/13</a:t>
             </a:fld>
             <a:endParaRPr lang="en-US"/>
           </a:p>
@@ -1765,7 +1765,7 @@
           <a:p>
             <a:fld id="{89247EA3-6A00-914C-B438-6883EA61F3F8}" type="datetimeFigureOut">
               <a:rPr lang="en-US" smtClean="0"/>
-              <a:t>9/5/13</a:t>
+              <a:t>9/7/13</a:t>
             </a:fld>
             <a:endParaRPr lang="en-US"/>
           </a:p>
@@ -1883,7 +1883,7 @@
           <a:p>
             <a:fld id="{89247EA3-6A00-914C-B438-6883EA61F3F8}" type="datetimeFigureOut">
               <a:rPr lang="en-US" smtClean="0"/>
-              <a:t>9/5/13</a:t>
+              <a:t>9/7/13</a:t>
             </a:fld>
             <a:endParaRPr lang="en-US"/>
           </a:p>
@@ -1978,7 +1978,7 @@
           <a:p>
             <a:fld id="{89247EA3-6A00-914C-B438-6883EA61F3F8}" type="datetimeFigureOut">
               <a:rPr lang="en-US" smtClean="0"/>
-              <a:t>9/5/13</a:t>
+              <a:t>9/7/13</a:t>
             </a:fld>
             <a:endParaRPr lang="en-US"/>
           </a:p>
@@ -2255,7 +2255,7 @@
           <a:p>
             <a:fld id="{89247EA3-6A00-914C-B438-6883EA61F3F8}" type="datetimeFigureOut">
               <a:rPr lang="en-US" smtClean="0"/>
-              <a:t>9/5/13</a:t>
+              <a:t>9/7/13</a:t>
             </a:fld>
             <a:endParaRPr lang="en-US"/>
           </a:p>
@@ -2508,7 +2508,7 @@
           <a:p>
             <a:fld id="{89247EA3-6A00-914C-B438-6883EA61F3F8}" type="datetimeFigureOut">
               <a:rPr lang="en-US" smtClean="0"/>
-              <a:t>9/5/13</a:t>
+              <a:t>9/7/13</a:t>
             </a:fld>
             <a:endParaRPr lang="en-US"/>
           </a:p>
@@ -2721,7 +2721,7 @@
           <a:p>
             <a:fld id="{89247EA3-6A00-914C-B438-6883EA61F3F8}" type="datetimeFigureOut">
               <a:rPr lang="en-US" smtClean="0"/>
-              <a:t>9/5/13</a:t>
+              <a:t>9/7/13</a:t>
             </a:fld>
             <a:endParaRPr lang="en-US"/>
           </a:p>
@@ -3642,8 +3642,8 @@
         </p:nvSpPr>
         <p:spPr>
           <a:xfrm>
-            <a:off x="6041820" y="1204879"/>
-            <a:ext cx="613081" cy="369332"/>
+            <a:off x="5559092" y="1204879"/>
+            <a:ext cx="1531677" cy="369332"/>
           </a:xfrm>
           <a:prstGeom prst="rect">
             <a:avLst/>
@@ -3658,7 +3658,7 @@
           <a:p>
             <a:r>
               <a:rPr lang="en-US" dirty="0" smtClean="0"/>
-              <a:t>Path</a:t>
+              <a:t>Resource Path</a:t>
             </a:r>
             <a:endParaRPr lang="en-US" dirty="0"/>
           </a:p>
@@ -3688,15 +3688,7 @@
           <a:p>
             <a:r>
               <a:rPr lang="en-US" sz="2400" dirty="0" smtClean="0"/>
-              <a:t>http://courses.washington.edu</a:t>
-            </a:r>
-            <a:r>
-              <a:rPr lang="en-US" sz="2400" dirty="0" smtClean="0"/>
-              <a:t>:8080</a:t>
-            </a:r>
-            <a:r>
-              <a:rPr lang="en-US" sz="2400" dirty="0" smtClean="0"/>
-              <a:t>/info343/stearns/</a:t>
+              <a:t>http://courses.washington.edu:8080/info343/stearns/</a:t>
             </a:r>
             <a:endParaRPr lang="en-US" sz="2400" dirty="0"/>
           </a:p>
@@ -3884,8 +3876,8 @@
         </p:nvSpPr>
         <p:spPr>
           <a:xfrm>
-            <a:off x="6720657" y="3353431"/>
-            <a:ext cx="613081" cy="369332"/>
+            <a:off x="6275037" y="3353431"/>
+            <a:ext cx="1531677" cy="369332"/>
           </a:xfrm>
           <a:prstGeom prst="rect">
             <a:avLst/>
@@ -3900,7 +3892,7 @@
           <a:p>
             <a:r>
               <a:rPr lang="en-US" dirty="0" smtClean="0"/>
-              <a:t>Path</a:t>
+              <a:t>Resource Path</a:t>
             </a:r>
             <a:endParaRPr lang="en-US" dirty="0"/>
           </a:p>

</xml_diff>